<commit_message>
chore(02-languages): Fixed some typos in pptx
</commit_message>
<xml_diff>
--- a/02-languages/01-teoria/04 Lodash.pptx
+++ b/02-languages/01-teoria/04 Lodash.pptx
@@ -81,9 +81,9 @@
         </a:solidFill>
         <a:effectLst/>
         <a:uFillTx/>
-        <a:latin typeface="+mn-lt"/>
-        <a:ea typeface="+mn-ea"/>
-        <a:cs typeface="+mn-cs"/>
+        <a:latin typeface="+mj-lt"/>
+        <a:ea typeface="+mj-ea"/>
+        <a:cs typeface="+mj-cs"/>
         <a:sym typeface="Calibri"/>
       </a:defRPr>
     </a:lvl1pPr>
@@ -111,9 +111,9 @@
         </a:solidFill>
         <a:effectLst/>
         <a:uFillTx/>
-        <a:latin typeface="+mn-lt"/>
-        <a:ea typeface="+mn-ea"/>
-        <a:cs typeface="+mn-cs"/>
+        <a:latin typeface="+mj-lt"/>
+        <a:ea typeface="+mj-ea"/>
+        <a:cs typeface="+mj-cs"/>
         <a:sym typeface="Calibri"/>
       </a:defRPr>
     </a:lvl2pPr>
@@ -141,9 +141,9 @@
         </a:solidFill>
         <a:effectLst/>
         <a:uFillTx/>
-        <a:latin typeface="+mn-lt"/>
-        <a:ea typeface="+mn-ea"/>
-        <a:cs typeface="+mn-cs"/>
+        <a:latin typeface="+mj-lt"/>
+        <a:ea typeface="+mj-ea"/>
+        <a:cs typeface="+mj-cs"/>
         <a:sym typeface="Calibri"/>
       </a:defRPr>
     </a:lvl3pPr>
@@ -171,9 +171,9 @@
         </a:solidFill>
         <a:effectLst/>
         <a:uFillTx/>
-        <a:latin typeface="+mn-lt"/>
-        <a:ea typeface="+mn-ea"/>
-        <a:cs typeface="+mn-cs"/>
+        <a:latin typeface="+mj-lt"/>
+        <a:ea typeface="+mj-ea"/>
+        <a:cs typeface="+mj-cs"/>
         <a:sym typeface="Calibri"/>
       </a:defRPr>
     </a:lvl4pPr>
@@ -201,9 +201,9 @@
         </a:solidFill>
         <a:effectLst/>
         <a:uFillTx/>
-        <a:latin typeface="+mn-lt"/>
-        <a:ea typeface="+mn-ea"/>
-        <a:cs typeface="+mn-cs"/>
+        <a:latin typeface="+mj-lt"/>
+        <a:ea typeface="+mj-ea"/>
+        <a:cs typeface="+mj-cs"/>
         <a:sym typeface="Calibri"/>
       </a:defRPr>
     </a:lvl5pPr>
@@ -231,9 +231,9 @@
         </a:solidFill>
         <a:effectLst/>
         <a:uFillTx/>
-        <a:latin typeface="+mn-lt"/>
-        <a:ea typeface="+mn-ea"/>
-        <a:cs typeface="+mn-cs"/>
+        <a:latin typeface="+mj-lt"/>
+        <a:ea typeface="+mj-ea"/>
+        <a:cs typeface="+mj-cs"/>
         <a:sym typeface="Calibri"/>
       </a:defRPr>
     </a:lvl6pPr>
@@ -261,9 +261,9 @@
         </a:solidFill>
         <a:effectLst/>
         <a:uFillTx/>
-        <a:latin typeface="+mn-lt"/>
-        <a:ea typeface="+mn-ea"/>
-        <a:cs typeface="+mn-cs"/>
+        <a:latin typeface="+mj-lt"/>
+        <a:ea typeface="+mj-ea"/>
+        <a:cs typeface="+mj-cs"/>
         <a:sym typeface="Calibri"/>
       </a:defRPr>
     </a:lvl7pPr>
@@ -291,9 +291,9 @@
         </a:solidFill>
         <a:effectLst/>
         <a:uFillTx/>
-        <a:latin typeface="+mn-lt"/>
-        <a:ea typeface="+mn-ea"/>
-        <a:cs typeface="+mn-cs"/>
+        <a:latin typeface="+mj-lt"/>
+        <a:ea typeface="+mj-ea"/>
+        <a:cs typeface="+mj-cs"/>
         <a:sym typeface="Calibri"/>
       </a:defRPr>
     </a:lvl8pPr>
@@ -321,9 +321,9 @@
         </a:solidFill>
         <a:effectLst/>
         <a:uFillTx/>
-        <a:latin typeface="+mn-lt"/>
-        <a:ea typeface="+mn-ea"/>
-        <a:cs typeface="+mn-cs"/>
+        <a:latin typeface="+mj-lt"/>
+        <a:ea typeface="+mj-ea"/>
+        <a:cs typeface="+mj-cs"/>
         <a:sym typeface="Calibri"/>
       </a:defRPr>
     </a:lvl9pPr>
@@ -408,73 +408,73 @@
   <p:notesStyle>
     <a:lvl1pPr latinLnBrk="0">
       <a:defRPr sz="1200">
-        <a:latin typeface="+mn-lt"/>
-        <a:ea typeface="+mn-ea"/>
-        <a:cs typeface="+mn-cs"/>
+        <a:latin typeface="+mj-lt"/>
+        <a:ea typeface="+mj-ea"/>
+        <a:cs typeface="+mj-cs"/>
         <a:sym typeface="Calibri"/>
       </a:defRPr>
     </a:lvl1pPr>
     <a:lvl2pPr indent="228600" latinLnBrk="0">
       <a:defRPr sz="1200">
-        <a:latin typeface="+mn-lt"/>
-        <a:ea typeface="+mn-ea"/>
-        <a:cs typeface="+mn-cs"/>
+        <a:latin typeface="+mj-lt"/>
+        <a:ea typeface="+mj-ea"/>
+        <a:cs typeface="+mj-cs"/>
         <a:sym typeface="Calibri"/>
       </a:defRPr>
     </a:lvl2pPr>
     <a:lvl3pPr indent="457200" latinLnBrk="0">
       <a:defRPr sz="1200">
-        <a:latin typeface="+mn-lt"/>
-        <a:ea typeface="+mn-ea"/>
-        <a:cs typeface="+mn-cs"/>
+        <a:latin typeface="+mj-lt"/>
+        <a:ea typeface="+mj-ea"/>
+        <a:cs typeface="+mj-cs"/>
         <a:sym typeface="Calibri"/>
       </a:defRPr>
     </a:lvl3pPr>
     <a:lvl4pPr indent="685800" latinLnBrk="0">
       <a:defRPr sz="1200">
-        <a:latin typeface="+mn-lt"/>
-        <a:ea typeface="+mn-ea"/>
-        <a:cs typeface="+mn-cs"/>
+        <a:latin typeface="+mj-lt"/>
+        <a:ea typeface="+mj-ea"/>
+        <a:cs typeface="+mj-cs"/>
         <a:sym typeface="Calibri"/>
       </a:defRPr>
     </a:lvl4pPr>
     <a:lvl5pPr indent="914400" latinLnBrk="0">
       <a:defRPr sz="1200">
-        <a:latin typeface="+mn-lt"/>
-        <a:ea typeface="+mn-ea"/>
-        <a:cs typeface="+mn-cs"/>
+        <a:latin typeface="+mj-lt"/>
+        <a:ea typeface="+mj-ea"/>
+        <a:cs typeface="+mj-cs"/>
         <a:sym typeface="Calibri"/>
       </a:defRPr>
     </a:lvl5pPr>
     <a:lvl6pPr indent="1143000" latinLnBrk="0">
       <a:defRPr sz="1200">
-        <a:latin typeface="+mn-lt"/>
-        <a:ea typeface="+mn-ea"/>
-        <a:cs typeface="+mn-cs"/>
+        <a:latin typeface="+mj-lt"/>
+        <a:ea typeface="+mj-ea"/>
+        <a:cs typeface="+mj-cs"/>
         <a:sym typeface="Calibri"/>
       </a:defRPr>
     </a:lvl6pPr>
     <a:lvl7pPr indent="1371600" latinLnBrk="0">
       <a:defRPr sz="1200">
-        <a:latin typeface="+mn-lt"/>
-        <a:ea typeface="+mn-ea"/>
-        <a:cs typeface="+mn-cs"/>
+        <a:latin typeface="+mj-lt"/>
+        <a:ea typeface="+mj-ea"/>
+        <a:cs typeface="+mj-cs"/>
         <a:sym typeface="Calibri"/>
       </a:defRPr>
     </a:lvl7pPr>
     <a:lvl8pPr indent="1600200" latinLnBrk="0">
       <a:defRPr sz="1200">
-        <a:latin typeface="+mn-lt"/>
-        <a:ea typeface="+mn-ea"/>
-        <a:cs typeface="+mn-cs"/>
+        <a:latin typeface="+mj-lt"/>
+        <a:ea typeface="+mj-ea"/>
+        <a:cs typeface="+mj-cs"/>
         <a:sym typeface="Calibri"/>
       </a:defRPr>
     </a:lvl8pPr>
     <a:lvl9pPr indent="1828800" latinLnBrk="0">
       <a:defRPr sz="1200">
-        <a:latin typeface="+mn-lt"/>
-        <a:ea typeface="+mn-ea"/>
-        <a:cs typeface="+mn-cs"/>
+        <a:latin typeface="+mj-lt"/>
+        <a:ea typeface="+mj-ea"/>
+        <a:cs typeface="+mj-cs"/>
         <a:sym typeface="Calibri"/>
       </a:defRPr>
     </a:lvl9pPr>
@@ -1263,7 +1263,7 @@
         <p:spPr>
           <a:xfrm>
             <a:off x="722312" y="3305176"/>
-            <a:ext cx="7772401" cy="1021559"/>
+            <a:ext cx="7772401" cy="1021560"/>
           </a:xfrm>
           <a:prstGeom prst="rect">
             <a:avLst/>
@@ -1702,7 +1702,7 @@
         <p:spPr>
           <a:xfrm>
             <a:off x="457200" y="1151333"/>
-            <a:ext cx="4040188" cy="479825"/>
+            <a:ext cx="4040188" cy="479826"/>
           </a:xfrm>
           <a:prstGeom prst="rect">
             <a:avLst/>
@@ -1825,7 +1825,7 @@
         <p:spPr>
           <a:xfrm>
             <a:off x="4645026" y="1151333"/>
-            <a:ext cx="4041778" cy="479825"/>
+            <a:ext cx="4041779" cy="479826"/>
           </a:xfrm>
           <a:prstGeom prst="rect">
             <a:avLst/>
@@ -2050,7 +2050,7 @@
         <p:spPr>
           <a:xfrm>
             <a:off x="457201" y="204785"/>
-            <a:ext cx="3008316" cy="871541"/>
+            <a:ext cx="3008317" cy="871541"/>
           </a:xfrm>
           <a:prstGeom prst="rect">
             <a:avLst/>
@@ -2286,7 +2286,7 @@
         <p:spPr>
           <a:xfrm>
             <a:off x="1792288" y="3600450"/>
-            <a:ext cx="5486403" cy="425054"/>
+            <a:ext cx="5486404" cy="425054"/>
           </a:xfrm>
           <a:prstGeom prst="rect">
             <a:avLst/>
@@ -2318,7 +2318,7 @@
         <p:spPr>
           <a:xfrm>
             <a:off x="1792288" y="459581"/>
-            <a:ext cx="5486403" cy="3086101"/>
+            <a:ext cx="5486404" cy="3086101"/>
           </a:xfrm>
           <a:prstGeom prst="rect">
             <a:avLst/>
@@ -2345,7 +2345,7 @@
         <p:spPr>
           <a:xfrm>
             <a:off x="1792288" y="4025503"/>
-            <a:ext cx="5486403" cy="603650"/>
+            <a:ext cx="5486404" cy="603651"/>
           </a:xfrm>
           <a:prstGeom prst="rect">
             <a:avLst/>
@@ -2630,8 +2630,8 @@
         </p:nvSpPr>
         <p:spPr>
           <a:xfrm>
-            <a:off x="6294581" y="4643112"/>
-            <a:ext cx="258621" cy="248302"/>
+            <a:off x="6294582" y="4643112"/>
+            <a:ext cx="258620" cy="248302"/>
           </a:xfrm>
           <a:prstGeom prst="rect">
             <a:avLst/>
@@ -3092,7 +3092,7 @@
           <a:sym typeface="Neo Sans Std Light"/>
         </a:defRPr>
       </a:lvl7pPr>
-      <a:lvl8pPr marL="3520438" marR="0" indent="-320038" algn="l" defTabSz="457200" rtl="0" latinLnBrk="0">
+      <a:lvl8pPr marL="3520437" marR="0" indent="-320038" algn="l" defTabSz="457200" rtl="0" latinLnBrk="0">
         <a:lnSpc>
           <a:spcPct val="100000"/>
         </a:lnSpc>
@@ -3118,7 +3118,7 @@
           <a:sym typeface="Neo Sans Std Light"/>
         </a:defRPr>
       </a:lvl8pPr>
-      <a:lvl9pPr marL="3977638" marR="0" indent="-320038" algn="l" defTabSz="457200" rtl="0" latinLnBrk="0">
+      <a:lvl9pPr marL="3977637" marR="0" indent="-320037" algn="l" defTabSz="457200" rtl="0" latinLnBrk="0">
         <a:lnSpc>
           <a:spcPct val="100000"/>
         </a:lnSpc>
@@ -3497,7 +3497,7 @@
         <p:spPr>
           <a:xfrm>
             <a:off x="647699" y="3442251"/>
-            <a:ext cx="8245476" cy="756003"/>
+            <a:ext cx="8245476" cy="756004"/>
           </a:xfrm>
           <a:prstGeom prst="rect">
             <a:avLst/>
@@ -3556,7 +3556,7 @@
         <p:spPr>
           <a:xfrm rot="16200000">
             <a:off x="7494248" y="3493746"/>
-            <a:ext cx="1701969" cy="1597540"/>
+            <a:ext cx="1701969" cy="1597541"/>
           </a:xfrm>
           <a:prstGeom prst="rect">
             <a:avLst/>
@@ -3675,8 +3675,8 @@
         </p:nvSpPr>
         <p:spPr>
           <a:xfrm>
-            <a:off x="911629" y="1555173"/>
-            <a:ext cx="2194562" cy="2537379"/>
+            <a:off x="911629" y="1555172"/>
+            <a:ext cx="2194563" cy="2537378"/>
           </a:xfrm>
           <a:prstGeom prst="rect">
             <a:avLst/>
@@ -3870,8 +3870,8 @@
         </p:nvSpPr>
         <p:spPr>
           <a:xfrm>
-            <a:off x="3373911" y="1555171"/>
-            <a:ext cx="1392731" cy="2537379"/>
+            <a:off x="3373911" y="1555170"/>
+            <a:ext cx="1392732" cy="2537378"/>
           </a:xfrm>
           <a:prstGeom prst="rect">
             <a:avLst/>
@@ -4014,8 +4014,8 @@
         </p:nvSpPr>
         <p:spPr>
           <a:xfrm>
-            <a:off x="5034365" y="1555171"/>
-            <a:ext cx="1565913" cy="2537380"/>
+            <a:off x="5034365" y="1555170"/>
+            <a:ext cx="1565914" cy="2537378"/>
           </a:xfrm>
           <a:prstGeom prst="rect">
             <a:avLst/>
@@ -4158,8 +4158,8 @@
         </p:nvSpPr>
         <p:spPr>
           <a:xfrm>
-            <a:off x="6868000" y="1555171"/>
-            <a:ext cx="1223012" cy="1641632"/>
+            <a:off x="6868000" y="1555170"/>
+            <a:ext cx="1223013" cy="1641631"/>
           </a:xfrm>
           <a:prstGeom prst="rect">
             <a:avLst/>
@@ -4365,8 +4365,8 @@
         </p:nvSpPr>
         <p:spPr>
           <a:xfrm>
-            <a:off x="1015541" y="1153390"/>
-            <a:ext cx="1654233" cy="2537379"/>
+            <a:off x="1015541" y="1153389"/>
+            <a:ext cx="1654233" cy="2537378"/>
           </a:xfrm>
           <a:prstGeom prst="rect">
             <a:avLst/>
@@ -4509,8 +4509,8 @@
         </p:nvSpPr>
         <p:spPr>
           <a:xfrm>
-            <a:off x="3100286" y="1153389"/>
-            <a:ext cx="1392731" cy="2537379"/>
+            <a:off x="3100285" y="1153388"/>
+            <a:ext cx="1392732" cy="2537378"/>
           </a:xfrm>
           <a:prstGeom prst="rect">
             <a:avLst/>
@@ -4754,8 +4754,8 @@
         </p:nvSpPr>
         <p:spPr>
           <a:xfrm>
-            <a:off x="668378" y="997528"/>
-            <a:ext cx="3191081" cy="3101588"/>
+            <a:off x="668378" y="997527"/>
+            <a:ext cx="3191081" cy="3101586"/>
           </a:xfrm>
           <a:prstGeom prst="rect">
             <a:avLst/>
@@ -5047,8 +5047,8 @@
         </p:nvSpPr>
         <p:spPr>
           <a:xfrm>
-            <a:off x="3272821" y="997528"/>
-            <a:ext cx="1693343" cy="2896353"/>
+            <a:off x="3272821" y="997527"/>
+            <a:ext cx="1693344" cy="2896352"/>
           </a:xfrm>
           <a:prstGeom prst="rect">
             <a:avLst/>
@@ -5230,7 +5230,7 @@
         <p:spPr>
           <a:xfrm>
             <a:off x="4868907" y="997526"/>
-            <a:ext cx="1787509" cy="2520339"/>
+            <a:ext cx="1787509" cy="2520336"/>
           </a:xfrm>
           <a:prstGeom prst="rect">
             <a:avLst/>
@@ -5392,8 +5392,8 @@
         </p:nvSpPr>
         <p:spPr>
           <a:xfrm>
-            <a:off x="6712929" y="997527"/>
-            <a:ext cx="2303017" cy="2588750"/>
+            <a:off x="6712929" y="997526"/>
+            <a:ext cx="2303018" cy="2588749"/>
           </a:xfrm>
           <a:prstGeom prst="rect">
             <a:avLst/>
@@ -5681,7 +5681,7 @@
         <p:spPr>
           <a:xfrm>
             <a:off x="1015541" y="1153389"/>
-            <a:ext cx="1654233" cy="2089507"/>
+            <a:ext cx="1654233" cy="2089504"/>
           </a:xfrm>
           <a:prstGeom prst="rect">
             <a:avLst/>
@@ -5805,8 +5805,8 @@
         </p:nvSpPr>
         <p:spPr>
           <a:xfrm>
-            <a:off x="3100286" y="1153388"/>
-            <a:ext cx="1392731" cy="2089507"/>
+            <a:off x="3100285" y="1153388"/>
+            <a:ext cx="1392732" cy="2089504"/>
           </a:xfrm>
           <a:prstGeom prst="rect">
             <a:avLst/>
@@ -6031,8 +6031,8 @@
         </p:nvSpPr>
         <p:spPr>
           <a:xfrm>
-            <a:off x="1015541" y="1153390"/>
-            <a:ext cx="1654233" cy="2537379"/>
+            <a:off x="1015541" y="1153389"/>
+            <a:ext cx="1654233" cy="2537378"/>
           </a:xfrm>
           <a:prstGeom prst="rect">
             <a:avLst/>
@@ -6175,8 +6175,8 @@
         </p:nvSpPr>
         <p:spPr>
           <a:xfrm>
-            <a:off x="3100286" y="1153389"/>
-            <a:ext cx="1392731" cy="2537379"/>
+            <a:off x="3100285" y="1153388"/>
+            <a:ext cx="1392732" cy="2537378"/>
           </a:xfrm>
           <a:prstGeom prst="rect">
             <a:avLst/>
@@ -6320,7 +6320,7 @@
         <p:spPr>
           <a:xfrm>
             <a:off x="4923530" y="1153389"/>
-            <a:ext cx="1392731" cy="298012"/>
+            <a:ext cx="1392732" cy="298010"/>
           </a:xfrm>
           <a:prstGeom prst="rect">
             <a:avLst/>
@@ -6477,8 +6477,8 @@
         </p:nvSpPr>
         <p:spPr>
           <a:xfrm>
-            <a:off x="1015538" y="1153390"/>
-            <a:ext cx="2485507" cy="2537379"/>
+            <a:off x="1015538" y="1153389"/>
+            <a:ext cx="2485508" cy="2537378"/>
           </a:xfrm>
           <a:prstGeom prst="rect">
             <a:avLst/>
@@ -6621,8 +6621,8 @@
         </p:nvSpPr>
         <p:spPr>
           <a:xfrm>
-            <a:off x="4000832" y="1153390"/>
-            <a:ext cx="1392731" cy="2537379"/>
+            <a:off x="4000832" y="1153389"/>
+            <a:ext cx="1392732" cy="2537378"/>
           </a:xfrm>
           <a:prstGeom prst="rect">
             <a:avLst/>
@@ -6766,7 +6766,7 @@
         <p:spPr>
           <a:xfrm>
             <a:off x="5485000" y="1153389"/>
-            <a:ext cx="2997116" cy="745885"/>
+            <a:ext cx="2997117" cy="745883"/>
           </a:xfrm>
           <a:prstGeom prst="rect">
             <a:avLst/>
@@ -6934,8 +6934,8 @@
         </p:nvSpPr>
         <p:spPr>
           <a:xfrm>
-            <a:off x="911630" y="1555173"/>
-            <a:ext cx="1453246" cy="2952312"/>
+            <a:off x="911630" y="1555172"/>
+            <a:ext cx="1453247" cy="2711011"/>
           </a:xfrm>
           <a:prstGeom prst="rect">
             <a:avLst/>
@@ -6967,6 +6967,22 @@
               </a:defRPr>
             </a:pPr>
             <a:r>
+              <a:t>(for)each</a:t>
+            </a:r>
+          </a:p>
+          <a:p>
+            <a:pPr>
+              <a:defRPr sz="1600">
+                <a:solidFill>
+                  <a:srgbClr val="242415"/>
+                </a:solidFill>
+                <a:latin typeface="Consolas"/>
+                <a:ea typeface="Consolas"/>
+                <a:cs typeface="Consolas"/>
+                <a:sym typeface="Consolas"/>
+              </a:defRPr>
+            </a:pPr>
+            <a:r>
               <a:t>concat</a:t>
             </a:r>
           </a:p>
@@ -6983,6 +6999,22 @@
               </a:defRPr>
             </a:pPr>
             <a:r>
+              <a:t>every</a:t>
+            </a:r>
+          </a:p>
+          <a:p>
+            <a:pPr>
+              <a:defRPr sz="1600">
+                <a:solidFill>
+                  <a:srgbClr val="242415"/>
+                </a:solidFill>
+                <a:latin typeface="Consolas"/>
+                <a:ea typeface="Consolas"/>
+                <a:cs typeface="Consolas"/>
+                <a:sym typeface="Consolas"/>
+              </a:defRPr>
+            </a:pPr>
+            <a:r>
               <a:t>fill</a:t>
             </a:r>
           </a:p>
@@ -6999,6 +7031,22 @@
               </a:defRPr>
             </a:pPr>
             <a:r>
+              <a:t>filter</a:t>
+            </a:r>
+          </a:p>
+          <a:p>
+            <a:pPr>
+              <a:defRPr sz="1600">
+                <a:solidFill>
+                  <a:srgbClr val="242415"/>
+                </a:solidFill>
+                <a:latin typeface="Consolas"/>
+                <a:ea typeface="Consolas"/>
+                <a:cs typeface="Consolas"/>
+                <a:sym typeface="Consolas"/>
+              </a:defRPr>
+            </a:pPr>
+            <a:r>
               <a:t>find</a:t>
             </a:r>
           </a:p>
@@ -7031,119 +7079,55 @@
               </a:defRPr>
             </a:pPr>
             <a:r>
+              <a:t>flatMap</a:t>
+            </a:r>
+          </a:p>
+          <a:p>
+            <a:pPr>
+              <a:defRPr sz="1600">
+                <a:solidFill>
+                  <a:srgbClr val="242415"/>
+                </a:solidFill>
+                <a:latin typeface="Consolas"/>
+                <a:ea typeface="Consolas"/>
+                <a:cs typeface="Consolas"/>
+                <a:sym typeface="Consolas"/>
+              </a:defRPr>
+            </a:pPr>
+            <a:r>
+              <a:t>flatten</a:t>
+            </a:r>
+          </a:p>
+          <a:p>
+            <a:pPr>
+              <a:defRPr sz="1600">
+                <a:solidFill>
+                  <a:srgbClr val="242415"/>
+                </a:solidFill>
+                <a:latin typeface="Consolas"/>
+                <a:ea typeface="Consolas"/>
+                <a:cs typeface="Consolas"/>
+                <a:sym typeface="Consolas"/>
+              </a:defRPr>
+            </a:pPr>
+            <a:r>
+              <a:t>includes</a:t>
+            </a:r>
+          </a:p>
+          <a:p>
+            <a:pPr>
+              <a:defRPr sz="1600">
+                <a:solidFill>
+                  <a:srgbClr val="242415"/>
+                </a:solidFill>
+                <a:latin typeface="Consolas"/>
+                <a:ea typeface="Consolas"/>
+                <a:cs typeface="Consolas"/>
+                <a:sym typeface="Consolas"/>
+              </a:defRPr>
+            </a:pPr>
+            <a:r>
               <a:t>indexOf</a:t>
-            </a:r>
-          </a:p>
-          <a:p>
-            <a:pPr>
-              <a:defRPr sz="1600">
-                <a:solidFill>
-                  <a:srgbClr val="242415"/>
-                </a:solidFill>
-                <a:latin typeface="Consolas"/>
-                <a:ea typeface="Consolas"/>
-                <a:cs typeface="Consolas"/>
-                <a:sym typeface="Consolas"/>
-              </a:defRPr>
-            </a:pPr>
-            <a:r>
-              <a:t>join</a:t>
-            </a:r>
-          </a:p>
-          <a:p>
-            <a:pPr>
-              <a:defRPr sz="1600">
-                <a:solidFill>
-                  <a:srgbClr val="242415"/>
-                </a:solidFill>
-                <a:latin typeface="Consolas"/>
-                <a:ea typeface="Consolas"/>
-                <a:cs typeface="Consolas"/>
-                <a:sym typeface="Consolas"/>
-              </a:defRPr>
-            </a:pPr>
-            <a:r>
-              <a:t>lastIndexOf</a:t>
-            </a:r>
-          </a:p>
-          <a:p>
-            <a:pPr>
-              <a:defRPr sz="1600">
-                <a:solidFill>
-                  <a:srgbClr val="242415"/>
-                </a:solidFill>
-                <a:latin typeface="Consolas"/>
-                <a:ea typeface="Consolas"/>
-                <a:cs typeface="Consolas"/>
-                <a:sym typeface="Consolas"/>
-              </a:defRPr>
-            </a:pPr>
-            <a:r>
-              <a:t>reverse</a:t>
-            </a:r>
-          </a:p>
-          <a:p>
-            <a:pPr>
-              <a:defRPr sz="1600">
-                <a:solidFill>
-                  <a:srgbClr val="242415"/>
-                </a:solidFill>
-                <a:latin typeface="Consolas"/>
-                <a:ea typeface="Consolas"/>
-                <a:cs typeface="Consolas"/>
-                <a:sym typeface="Consolas"/>
-              </a:defRPr>
-            </a:pPr>
-            <a:r>
-              <a:t>slice</a:t>
-            </a:r>
-          </a:p>
-          <a:p>
-            <a:pPr>
-              <a:defRPr sz="1600">
-                <a:solidFill>
-                  <a:srgbClr val="242415"/>
-                </a:solidFill>
-                <a:latin typeface="Consolas"/>
-                <a:ea typeface="Consolas"/>
-                <a:cs typeface="Consolas"/>
-                <a:sym typeface="Consolas"/>
-              </a:defRPr>
-            </a:pPr>
-            <a:r>
-              <a:t>(for)each</a:t>
-            </a:r>
-          </a:p>
-          <a:p>
-            <a:pPr>
-              <a:defRPr sz="1600">
-                <a:solidFill>
-                  <a:srgbClr val="242415"/>
-                </a:solidFill>
-                <a:latin typeface="Consolas"/>
-                <a:ea typeface="Consolas"/>
-                <a:cs typeface="Consolas"/>
-                <a:sym typeface="Consolas"/>
-              </a:defRPr>
-            </a:pPr>
-            <a:r>
-              <a:t>every</a:t>
-            </a:r>
-          </a:p>
-          <a:p>
-            <a:pPr>
-              <a:defRPr sz="1600">
-                <a:solidFill>
-                  <a:srgbClr val="242415"/>
-                </a:solidFill>
-                <a:latin typeface="Consolas"/>
-                <a:ea typeface="Consolas"/>
-                <a:cs typeface="Consolas"/>
-                <a:sym typeface="Consolas"/>
-              </a:defRPr>
-            </a:pPr>
-            <a:r>
-              <a:t>filter</a:t>
             </a:r>
           </a:p>
         </p:txBody>
@@ -7207,8 +7191,8 @@
         </p:nvSpPr>
         <p:spPr>
           <a:xfrm>
-            <a:off x="2321692" y="1555170"/>
-            <a:ext cx="1577337" cy="1263213"/>
+            <a:off x="2321691" y="1555169"/>
+            <a:ext cx="1577339" cy="2228411"/>
           </a:xfrm>
           <a:prstGeom prst="rect">
             <a:avLst/>
@@ -7240,7 +7224,7 @@
               </a:defRPr>
             </a:pPr>
             <a:r>
-              <a:t>includes</a:t>
+              <a:t>isArray</a:t>
             </a:r>
           </a:p>
           <a:p>
@@ -7256,6 +7240,38 @@
               </a:defRPr>
             </a:pPr>
             <a:r>
+              <a:t>join</a:t>
+            </a:r>
+          </a:p>
+          <a:p>
+            <a:pPr>
+              <a:defRPr sz="1600">
+                <a:solidFill>
+                  <a:srgbClr val="242415"/>
+                </a:solidFill>
+                <a:latin typeface="Consolas"/>
+                <a:ea typeface="Consolas"/>
+                <a:cs typeface="Consolas"/>
+                <a:sym typeface="Consolas"/>
+              </a:defRPr>
+            </a:pPr>
+            <a:r>
+              <a:t>lastIndexOf</a:t>
+            </a:r>
+          </a:p>
+          <a:p>
+            <a:pPr>
+              <a:defRPr sz="1600">
+                <a:solidFill>
+                  <a:srgbClr val="242415"/>
+                </a:solidFill>
+                <a:latin typeface="Consolas"/>
+                <a:ea typeface="Consolas"/>
+                <a:cs typeface="Consolas"/>
+                <a:sym typeface="Consolas"/>
+              </a:defRPr>
+            </a:pPr>
+            <a:r>
               <a:t>map</a:t>
             </a:r>
           </a:p>
@@ -7289,6 +7305,38 @@
             </a:pPr>
             <a:r>
               <a:t>reduceRight</a:t>
+            </a:r>
+          </a:p>
+          <a:p>
+            <a:pPr>
+              <a:defRPr sz="1600">
+                <a:solidFill>
+                  <a:srgbClr val="242415"/>
+                </a:solidFill>
+                <a:latin typeface="Consolas"/>
+                <a:ea typeface="Consolas"/>
+                <a:cs typeface="Consolas"/>
+                <a:sym typeface="Consolas"/>
+              </a:defRPr>
+            </a:pPr>
+            <a:r>
+              <a:t>reverse</a:t>
+            </a:r>
+          </a:p>
+          <a:p>
+            <a:pPr>
+              <a:defRPr sz="1600">
+                <a:solidFill>
+                  <a:srgbClr val="242415"/>
+                </a:solidFill>
+                <a:latin typeface="Consolas"/>
+                <a:ea typeface="Consolas"/>
+                <a:cs typeface="Consolas"/>
+                <a:sym typeface="Consolas"/>
+              </a:defRPr>
+            </a:pPr>
+            <a:r>
+              <a:t>slice</a:t>
             </a:r>
           </a:p>
           <a:p>
@@ -7317,8 +7365,8 @@
         </p:nvSpPr>
         <p:spPr>
           <a:xfrm>
-            <a:off x="6621726" y="1556904"/>
-            <a:ext cx="2109409" cy="1504513"/>
+            <a:off x="6621726" y="1556903"/>
+            <a:ext cx="2109410" cy="2711011"/>
           </a:xfrm>
           <a:prstGeom prst="rect">
             <a:avLst/>
@@ -7350,6 +7398,54 @@
               </a:defRPr>
             </a:pPr>
             <a:r>
+              <a:t>endsWith</a:t>
+            </a:r>
+          </a:p>
+          <a:p>
+            <a:pPr>
+              <a:defRPr sz="1600">
+                <a:solidFill>
+                  <a:srgbClr val="242415"/>
+                </a:solidFill>
+                <a:latin typeface="Consolas"/>
+                <a:ea typeface="Consolas"/>
+                <a:cs typeface="Consolas"/>
+                <a:sym typeface="Consolas"/>
+              </a:defRPr>
+            </a:pPr>
+            <a:r>
+              <a:t>padEnd</a:t>
+            </a:r>
+          </a:p>
+          <a:p>
+            <a:pPr>
+              <a:defRPr sz="1600">
+                <a:solidFill>
+                  <a:srgbClr val="242415"/>
+                </a:solidFill>
+                <a:latin typeface="Consolas"/>
+                <a:ea typeface="Consolas"/>
+                <a:cs typeface="Consolas"/>
+                <a:sym typeface="Consolas"/>
+              </a:defRPr>
+            </a:pPr>
+            <a:r>
+              <a:t>padStart</a:t>
+            </a:r>
+          </a:p>
+          <a:p>
+            <a:pPr>
+              <a:defRPr sz="1600">
+                <a:solidFill>
+                  <a:srgbClr val="242415"/>
+                </a:solidFill>
+                <a:latin typeface="Consolas"/>
+                <a:ea typeface="Consolas"/>
+                <a:cs typeface="Consolas"/>
+                <a:sym typeface="Consolas"/>
+              </a:defRPr>
+            </a:pPr>
+            <a:r>
               <a:t>repeat</a:t>
             </a:r>
           </a:p>
@@ -7366,6 +7462,54 @@
               </a:defRPr>
             </a:pPr>
             <a:r>
+              <a:t>replace</a:t>
+            </a:r>
+          </a:p>
+          <a:p>
+            <a:pPr>
+              <a:defRPr sz="1600">
+                <a:solidFill>
+                  <a:srgbClr val="242415"/>
+                </a:solidFill>
+                <a:latin typeface="Consolas"/>
+                <a:ea typeface="Consolas"/>
+                <a:cs typeface="Consolas"/>
+                <a:sym typeface="Consolas"/>
+              </a:defRPr>
+            </a:pPr>
+            <a:r>
+              <a:t>split</a:t>
+            </a:r>
+          </a:p>
+          <a:p>
+            <a:pPr>
+              <a:defRPr sz="1600">
+                <a:solidFill>
+                  <a:srgbClr val="242415"/>
+                </a:solidFill>
+                <a:latin typeface="Consolas"/>
+                <a:ea typeface="Consolas"/>
+                <a:cs typeface="Consolas"/>
+                <a:sym typeface="Consolas"/>
+              </a:defRPr>
+            </a:pPr>
+            <a:r>
+              <a:t>startsWith</a:t>
+            </a:r>
+          </a:p>
+          <a:p>
+            <a:pPr>
+              <a:defRPr sz="1600">
+                <a:solidFill>
+                  <a:srgbClr val="242415"/>
+                </a:solidFill>
+                <a:latin typeface="Consolas"/>
+                <a:ea typeface="Consolas"/>
+                <a:cs typeface="Consolas"/>
+                <a:sym typeface="Consolas"/>
+              </a:defRPr>
+            </a:pPr>
+            <a:r>
               <a:t>template (literal)</a:t>
             </a:r>
           </a:p>
@@ -7415,22 +7559,6 @@
             </a:pPr>
             <a:r>
               <a:t>trim</a:t>
-            </a:r>
-          </a:p>
-          <a:p>
-            <a:pPr>
-              <a:defRPr sz="1600">
-                <a:solidFill>
-                  <a:srgbClr val="242415"/>
-                </a:solidFill>
-                <a:latin typeface="Consolas"/>
-                <a:ea typeface="Consolas"/>
-                <a:cs typeface="Consolas"/>
-                <a:sym typeface="Consolas"/>
-              </a:defRPr>
-            </a:pPr>
-            <a:r>
-              <a:t>replace</a:t>
             </a:r>
           </a:p>
         </p:txBody>
@@ -7443,8 +7571,8 @@
         </p:nvSpPr>
         <p:spPr>
           <a:xfrm>
-            <a:off x="4133177" y="1555170"/>
-            <a:ext cx="1996770" cy="1021913"/>
+            <a:off x="4133177" y="1555169"/>
+            <a:ext cx="1996771" cy="1021911"/>
           </a:xfrm>
           <a:prstGeom prst="rect">
             <a:avLst/>
@@ -7538,7 +7666,7 @@
         <p:spPr>
           <a:xfrm>
             <a:off x="4133177" y="3190008"/>
-            <a:ext cx="1996770" cy="298012"/>
+            <a:ext cx="1996771" cy="298010"/>
           </a:xfrm>
           <a:prstGeom prst="rect">
             <a:avLst/>
@@ -7738,10 +7866,10 @@
         </p:nvGrpSpPr>
         <p:grpSpPr>
           <a:xfrm>
-            <a:off x="5271194" y="279318"/>
-            <a:ext cx="1389889" cy="448828"/>
-            <a:chOff x="0" y="0"/>
-            <a:chExt cx="1389887" cy="448826"/>
+            <a:off x="5271194" y="279316"/>
+            <a:ext cx="1389891" cy="448829"/>
+            <a:chOff x="0" y="-1"/>
+            <a:chExt cx="1389889" cy="448827"/>
           </a:xfrm>
         </p:grpSpPr>
         <p:sp>
@@ -7752,8 +7880,8 @@
           </p:nvSpPr>
           <p:spPr>
             <a:xfrm>
-              <a:off x="0" y="-1"/>
-              <a:ext cx="1389888" cy="427197"/>
+              <a:off x="0" y="-2"/>
+              <a:ext cx="1389890" cy="427200"/>
             </a:xfrm>
             <a:prstGeom prst="roundRect">
               <a:avLst>
@@ -7798,7 +7926,7 @@
           <p:spPr>
             <a:xfrm>
               <a:off x="14489" y="14490"/>
-              <a:ext cx="1364216" cy="434337"/>
+              <a:ext cx="1364215" cy="434337"/>
             </a:xfrm>
             <a:prstGeom prst="rect">
               <a:avLst/>
@@ -7950,8 +8078,8 @@
         </p:nvSpPr>
         <p:spPr>
           <a:xfrm>
-            <a:off x="1015541" y="1153390"/>
-            <a:ext cx="1654233" cy="2537379"/>
+            <a:off x="1015541" y="1153389"/>
+            <a:ext cx="1654233" cy="2537378"/>
           </a:xfrm>
           <a:prstGeom prst="rect">
             <a:avLst/>
@@ -7986,7 +8114,7 @@
               </a:defRPr>
             </a:pPr>
             <a:r>
-              <a:t>compact</a:t>
+              <a:t>after</a:t>
             </a:r>
           </a:p>
           <a:p>
@@ -8005,7 +8133,7 @@
               </a:defRPr>
             </a:pPr>
             <a:r>
-              <a:t>flatten</a:t>
+              <a:t>compact</a:t>
             </a:r>
           </a:p>
           <a:p>
@@ -8024,7 +8152,7 @@
               </a:defRPr>
             </a:pPr>
             <a:r>
-              <a:t>flattenDeep</a:t>
+              <a:t>flatten</a:t>
             </a:r>
           </a:p>
           <a:p>
@@ -8043,7 +8171,7 @@
               </a:defRPr>
             </a:pPr>
             <a:r>
-              <a:t>head</a:t>
+              <a:t>flattenDeep</a:t>
             </a:r>
           </a:p>
           <a:p>
@@ -8062,7 +8190,7 @@
               </a:defRPr>
             </a:pPr>
             <a:r>
-              <a:t>tail</a:t>
+              <a:t>head</a:t>
             </a:r>
           </a:p>
           <a:p>
@@ -8094,8 +8222,8 @@
         </p:nvSpPr>
         <p:spPr>
           <a:xfrm>
-            <a:off x="3100286" y="1153389"/>
-            <a:ext cx="1392731" cy="2537379"/>
+            <a:off x="3100285" y="1153388"/>
+            <a:ext cx="1392732" cy="2537378"/>
           </a:xfrm>
           <a:prstGeom prst="rect">
             <a:avLst/>
@@ -8130,7 +8258,7 @@
               </a:defRPr>
             </a:pPr>
             <a:r>
-              <a:t>without</a:t>
+              <a:t>is*</a:t>
             </a:r>
           </a:p>
           <a:p>
@@ -8149,7 +8277,7 @@
               </a:defRPr>
             </a:pPr>
             <a:r>
-              <a:t>minBy</a:t>
+              <a:t>maxBy</a:t>
             </a:r>
           </a:p>
           <a:p>
@@ -8168,7 +8296,7 @@
               </a:defRPr>
             </a:pPr>
             <a:r>
-              <a:t>maxBy</a:t>
+              <a:t>minBy</a:t>
             </a:r>
           </a:p>
           <a:p>
@@ -8187,7 +8315,7 @@
               </a:defRPr>
             </a:pPr>
             <a:r>
-              <a:t>range</a:t>
+              <a:t>nth</a:t>
             </a:r>
           </a:p>
           <a:p>
@@ -8206,7 +8334,7 @@
               </a:defRPr>
             </a:pPr>
             <a:r>
-              <a:t>size</a:t>
+              <a:t>omit</a:t>
             </a:r>
           </a:p>
           <a:p>
@@ -8225,7 +8353,7 @@
               </a:defRPr>
             </a:pPr>
             <a:r>
-              <a:t>after</a:t>
+              <a:t>pick</a:t>
             </a:r>
           </a:p>
         </p:txBody>
@@ -8239,7 +8367,7 @@
         <p:spPr>
           <a:xfrm>
             <a:off x="4617718" y="1153389"/>
-            <a:ext cx="1392732" cy="298012"/>
+            <a:ext cx="1392733" cy="2089504"/>
           </a:xfrm>
           <a:prstGeom prst="rect">
             <a:avLst/>
@@ -8257,8 +8385,9 @@
           <a:bodyPr lIns="45718" tIns="45718" rIns="45718" bIns="45718">
             <a:spAutoFit/>
           </a:bodyPr>
-          <a:lstStyle>
-            <a:lvl1pPr>
+          <a:lstStyle/>
+          <a:p>
+            <a:pPr>
               <a:lnSpc>
                 <a:spcPct val="200000"/>
               </a:lnSpc>
@@ -8271,12 +8400,85 @@
                 <a:cs typeface="Consolas"/>
                 <a:sym typeface="Consolas"/>
               </a:defRPr>
-            </a:lvl1pPr>
-          </a:lstStyle>
-          <a:p>
-            <a:pPr/>
-            <a:r>
-              <a:t>nth</a:t>
+            </a:pPr>
+            <a:r>
+              <a:t>range</a:t>
+            </a:r>
+          </a:p>
+          <a:p>
+            <a:pPr>
+              <a:lnSpc>
+                <a:spcPct val="200000"/>
+              </a:lnSpc>
+              <a:defRPr sz="1600">
+                <a:solidFill>
+                  <a:srgbClr val="242415"/>
+                </a:solidFill>
+                <a:latin typeface="Consolas"/>
+                <a:ea typeface="Consolas"/>
+                <a:cs typeface="Consolas"/>
+                <a:sym typeface="Consolas"/>
+              </a:defRPr>
+            </a:pPr>
+            <a:r>
+              <a:t>size</a:t>
+            </a:r>
+          </a:p>
+          <a:p>
+            <a:pPr>
+              <a:lnSpc>
+                <a:spcPct val="200000"/>
+              </a:lnSpc>
+              <a:defRPr sz="1600">
+                <a:solidFill>
+                  <a:srgbClr val="242415"/>
+                </a:solidFill>
+                <a:latin typeface="Consolas"/>
+                <a:ea typeface="Consolas"/>
+                <a:cs typeface="Consolas"/>
+                <a:sym typeface="Consolas"/>
+              </a:defRPr>
+            </a:pPr>
+            <a:r>
+              <a:t>tail</a:t>
+            </a:r>
+          </a:p>
+          <a:p>
+            <a:pPr>
+              <a:lnSpc>
+                <a:spcPct val="200000"/>
+              </a:lnSpc>
+              <a:defRPr sz="1600">
+                <a:solidFill>
+                  <a:srgbClr val="242415"/>
+                </a:solidFill>
+                <a:latin typeface="Consolas"/>
+                <a:ea typeface="Consolas"/>
+                <a:cs typeface="Consolas"/>
+                <a:sym typeface="Consolas"/>
+              </a:defRPr>
+            </a:pPr>
+            <a:r>
+              <a:t>uniq</a:t>
+            </a:r>
+          </a:p>
+          <a:p>
+            <a:pPr>
+              <a:lnSpc>
+                <a:spcPct val="200000"/>
+              </a:lnSpc>
+              <a:defRPr sz="1600">
+                <a:solidFill>
+                  <a:srgbClr val="242415"/>
+                </a:solidFill>
+                <a:latin typeface="Consolas"/>
+                <a:ea typeface="Consolas"/>
+                <a:cs typeface="Consolas"/>
+                <a:sym typeface="Consolas"/>
+              </a:defRPr>
+            </a:pPr>
+            <a:r>
+              <a:t>without</a:t>
             </a:r>
           </a:p>
         </p:txBody>
@@ -8518,7 +8720,7 @@
         </p:nvSpPr>
         <p:spPr>
           <a:xfrm>
-            <a:off x="900108" y="2666988"/>
+            <a:off x="900108" y="2666987"/>
             <a:ext cx="7653195" cy="304801"/>
           </a:xfrm>
           <a:prstGeom prst="rect">
@@ -8884,7 +9086,7 @@
         <p:spPr>
           <a:xfrm>
             <a:off x="4218292" y="4329110"/>
-            <a:ext cx="360003" cy="360003"/>
+            <a:ext cx="360004" cy="360004"/>
           </a:xfrm>
           <a:prstGeom prst="rect">
             <a:avLst/>
@@ -8913,7 +9115,7 @@
         <p:spPr>
           <a:xfrm>
             <a:off x="4218292" y="3786080"/>
-            <a:ext cx="360003" cy="360003"/>
+            <a:ext cx="360004" cy="360004"/>
           </a:xfrm>
           <a:prstGeom prst="rect">
             <a:avLst/>
@@ -8942,7 +9144,7 @@
         <p:spPr>
           <a:xfrm>
             <a:off x="1365920" y="4333776"/>
-            <a:ext cx="360003" cy="360003"/>
+            <a:ext cx="360004" cy="360004"/>
           </a:xfrm>
           <a:prstGeom prst="rect">
             <a:avLst/>
@@ -8971,7 +9173,7 @@
         <p:spPr>
           <a:xfrm>
             <a:off x="1365920" y="3800404"/>
-            <a:ext cx="360003" cy="360003"/>
+            <a:ext cx="360004" cy="360004"/>
           </a:xfrm>
           <a:prstGeom prst="rect">
             <a:avLst/>
@@ -8989,10 +9191,10 @@
         </p:nvGrpSpPr>
         <p:grpSpPr>
           <a:xfrm>
-            <a:off x="1771308" y="3781413"/>
-            <a:ext cx="6298736" cy="918535"/>
-            <a:chOff x="0" y="0"/>
-            <a:chExt cx="6298734" cy="918534"/>
+            <a:off x="1771307" y="3781411"/>
+            <a:ext cx="6298737" cy="918536"/>
+            <a:chOff x="0" y="-1"/>
+            <a:chExt cx="6298736" cy="918534"/>
           </a:xfrm>
         </p:grpSpPr>
         <p:sp>
@@ -9003,8 +9205,8 @@
           </p:nvSpPr>
           <p:spPr>
             <a:xfrm>
-              <a:off x="2852369" y="-1"/>
-              <a:ext cx="3282599" cy="370837"/>
+              <a:off x="2852369" y="-2"/>
+              <a:ext cx="3282601" cy="370837"/>
             </a:xfrm>
             <a:prstGeom prst="rect">
               <a:avLst/>
@@ -9055,7 +9257,7 @@
           <p:spPr>
             <a:xfrm>
               <a:off x="-1" y="547697"/>
-              <a:ext cx="1972174" cy="370837"/>
+              <a:ext cx="1972175" cy="370837"/>
             </a:xfrm>
             <a:prstGeom prst="rect">
               <a:avLst/>
@@ -9106,7 +9308,7 @@
           <p:spPr>
             <a:xfrm>
               <a:off x="2852369" y="543031"/>
-              <a:ext cx="3446365" cy="370837"/>
+              <a:ext cx="3446367" cy="370837"/>
             </a:xfrm>
             <a:prstGeom prst="rect">
               <a:avLst/>
@@ -9157,7 +9359,7 @@
           <p:spPr>
             <a:xfrm>
               <a:off x="5136" y="14325"/>
-              <a:ext cx="2027660" cy="370837"/>
+              <a:ext cx="2027661" cy="370837"/>
             </a:xfrm>
             <a:prstGeom prst="rect">
               <a:avLst/>
@@ -10090,7 +10292,7 @@
         </p:nvSpPr>
         <p:spPr>
           <a:xfrm>
-            <a:off x="900110" y="2860326"/>
+            <a:off x="900110" y="2860325"/>
             <a:ext cx="7653195" cy="609601"/>
           </a:xfrm>
           <a:prstGeom prst="rect">
@@ -10192,8 +10394,8 @@
         </p:nvSpPr>
         <p:spPr>
           <a:xfrm>
-            <a:off x="1369730" y="1740753"/>
-            <a:ext cx="4572003" cy="761033"/>
+            <a:off x="1369729" y="1740753"/>
+            <a:ext cx="4572005" cy="761033"/>
           </a:xfrm>
           <a:prstGeom prst="rect">
             <a:avLst/>
@@ -10270,8 +10472,8 @@
         </p:nvGrpSpPr>
         <p:grpSpPr>
           <a:xfrm>
-            <a:off x="2749869" y="3850111"/>
-            <a:ext cx="3644261" cy="396237"/>
+            <a:off x="2749868" y="3850111"/>
+            <a:ext cx="3644262" cy="396237"/>
             <a:chOff x="0" y="0"/>
             <a:chExt cx="3644260" cy="396235"/>
           </a:xfrm>
@@ -10285,7 +10487,7 @@
           <p:spPr>
             <a:xfrm>
               <a:off x="-1" y="0"/>
-              <a:ext cx="3644261" cy="396237"/>
+              <a:ext cx="3644262" cy="396237"/>
             </a:xfrm>
             <a:prstGeom prst="rect">
               <a:avLst/>
@@ -10348,7 +10550,7 @@
           <p:spPr>
             <a:xfrm>
               <a:off x="87588" y="35636"/>
-              <a:ext cx="260010" cy="260009"/>
+              <a:ext cx="260011" cy="260011"/>
             </a:xfrm>
             <a:prstGeom prst="rect">
               <a:avLst/>
@@ -10476,9 +10678,9 @@
         <p:grpSpPr>
           <a:xfrm>
             <a:off x="1424252" y="1037317"/>
-            <a:ext cx="958383" cy="416183"/>
+            <a:ext cx="958384" cy="416183"/>
             <a:chOff x="0" y="0"/>
-            <a:chExt cx="958382" cy="416182"/>
+            <a:chExt cx="958383" cy="416182"/>
           </a:xfrm>
         </p:grpSpPr>
         <p:sp>
@@ -10490,7 +10692,7 @@
           <p:spPr>
             <a:xfrm>
               <a:off x="0" y="0"/>
-              <a:ext cx="958383" cy="408623"/>
+              <a:ext cx="958384" cy="408624"/>
             </a:xfrm>
             <a:prstGeom prst="roundRect">
               <a:avLst>
@@ -10586,8 +10788,8 @@
         </p:nvSpPr>
         <p:spPr>
           <a:xfrm>
-            <a:off x="2630364" y="1089225"/>
-            <a:ext cx="2140075" cy="304801"/>
+            <a:off x="2630364" y="1089224"/>
+            <a:ext cx="2140076" cy="304801"/>
           </a:xfrm>
           <a:prstGeom prst="rect">
             <a:avLst/>
@@ -10649,10 +10851,10 @@
         </p:nvGrpSpPr>
         <p:grpSpPr>
           <a:xfrm>
-            <a:off x="1040592" y="1562655"/>
-            <a:ext cx="1342044" cy="416183"/>
+            <a:off x="1040591" y="1562655"/>
+            <a:ext cx="1342047" cy="416183"/>
             <a:chOff x="0" y="0"/>
-            <a:chExt cx="1342042" cy="416182"/>
+            <a:chExt cx="1342045" cy="416182"/>
           </a:xfrm>
         </p:grpSpPr>
         <p:sp>
@@ -10663,8 +10865,8 @@
           </p:nvSpPr>
           <p:spPr>
             <a:xfrm>
-              <a:off x="0" y="0"/>
-              <a:ext cx="1342044" cy="408623"/>
+              <a:off x="-1" y="0"/>
+              <a:ext cx="1342047" cy="408624"/>
             </a:xfrm>
             <a:prstGeom prst="roundRect">
               <a:avLst>
@@ -10708,8 +10910,8 @@
           </p:nvSpPr>
           <p:spPr>
             <a:xfrm>
-              <a:off x="19947" y="19946"/>
-              <a:ext cx="1306965" cy="396237"/>
+              <a:off x="19946" y="19946"/>
+              <a:ext cx="1306966" cy="396237"/>
             </a:xfrm>
             <a:prstGeom prst="rect">
               <a:avLst/>
@@ -10761,7 +10963,7 @@
         <p:spPr>
           <a:xfrm>
             <a:off x="2630363" y="1609413"/>
-            <a:ext cx="3590330" cy="304801"/>
+            <a:ext cx="3590331" cy="304801"/>
           </a:xfrm>
           <a:prstGeom prst="rect">
             <a:avLst/>
@@ -10817,10 +11019,10 @@
         </p:nvGrpSpPr>
         <p:grpSpPr>
           <a:xfrm>
-            <a:off x="1703209" y="2082843"/>
-            <a:ext cx="679427" cy="416183"/>
-            <a:chOff x="0" y="0"/>
-            <a:chExt cx="679426" cy="416182"/>
+            <a:off x="1703208" y="2082843"/>
+            <a:ext cx="679430" cy="416183"/>
+            <a:chOff x="-1" y="0"/>
+            <a:chExt cx="679429" cy="416182"/>
           </a:xfrm>
         </p:grpSpPr>
         <p:sp>
@@ -10831,8 +11033,8 @@
           </p:nvSpPr>
           <p:spPr>
             <a:xfrm>
-              <a:off x="-1" y="0"/>
-              <a:ext cx="679428" cy="408623"/>
+              <a:off x="-2" y="0"/>
+              <a:ext cx="679431" cy="408624"/>
             </a:xfrm>
             <a:prstGeom prst="roundRect">
               <a:avLst>
@@ -10929,7 +11131,7 @@
         <p:spPr>
           <a:xfrm>
             <a:off x="2630364" y="2129600"/>
-            <a:ext cx="3091565" cy="304801"/>
+            <a:ext cx="3091566" cy="304801"/>
           </a:xfrm>
           <a:prstGeom prst="rect">
             <a:avLst/>
@@ -10985,10 +11187,10 @@
         </p:nvGrpSpPr>
         <p:grpSpPr>
           <a:xfrm>
-            <a:off x="1615310" y="2603030"/>
-            <a:ext cx="767326" cy="416183"/>
-            <a:chOff x="0" y="0"/>
-            <a:chExt cx="767325" cy="416182"/>
+            <a:off x="1615309" y="2603030"/>
+            <a:ext cx="767329" cy="416183"/>
+            <a:chOff x="-1" y="0"/>
+            <a:chExt cx="767328" cy="416182"/>
           </a:xfrm>
         </p:grpSpPr>
         <p:sp>
@@ -10999,8 +11201,8 @@
           </p:nvSpPr>
           <p:spPr>
             <a:xfrm>
-              <a:off x="-1" y="0"/>
-              <a:ext cx="767327" cy="408623"/>
+              <a:off x="-2" y="0"/>
+              <a:ext cx="767330" cy="408624"/>
             </a:xfrm>
             <a:prstGeom prst="roundRect">
               <a:avLst>
@@ -11096,8 +11298,8 @@
         </p:nvSpPr>
         <p:spPr>
           <a:xfrm>
-            <a:off x="2630363" y="2649786"/>
-            <a:ext cx="2970339" cy="304801"/>
+            <a:off x="2630363" y="2649785"/>
+            <a:ext cx="2970340" cy="304801"/>
           </a:xfrm>
           <a:prstGeom prst="rect">
             <a:avLst/>
@@ -11153,10 +11355,10 @@
         </p:nvGrpSpPr>
         <p:grpSpPr>
           <a:xfrm>
-            <a:off x="1544728" y="3123215"/>
-            <a:ext cx="837906" cy="416184"/>
+            <a:off x="1544728" y="3123214"/>
+            <a:ext cx="837908" cy="416184"/>
             <a:chOff x="0" y="0"/>
-            <a:chExt cx="837905" cy="416182"/>
+            <a:chExt cx="837906" cy="416182"/>
           </a:xfrm>
         </p:grpSpPr>
         <p:sp>
@@ -11167,8 +11369,8 @@
           </p:nvSpPr>
           <p:spPr>
             <a:xfrm>
-              <a:off x="0" y="0"/>
-              <a:ext cx="837906" cy="408623"/>
+              <a:off x="0" y="-1"/>
+              <a:ext cx="837908" cy="408626"/>
             </a:xfrm>
             <a:prstGeom prst="roundRect">
               <a:avLst>
@@ -11265,7 +11467,7 @@
         <p:spPr>
           <a:xfrm>
             <a:off x="2630364" y="3169972"/>
-            <a:ext cx="2242974" cy="304801"/>
+            <a:ext cx="2242975" cy="304801"/>
           </a:xfrm>
           <a:prstGeom prst="rect">
             <a:avLst/>
@@ -11322,9 +11524,9 @@
         <p:grpSpPr>
           <a:xfrm>
             <a:off x="1019147" y="3638251"/>
-            <a:ext cx="1363487" cy="416183"/>
+            <a:ext cx="1363489" cy="416183"/>
             <a:chOff x="0" y="0"/>
-            <a:chExt cx="1363486" cy="416182"/>
+            <a:chExt cx="1363487" cy="416182"/>
           </a:xfrm>
         </p:grpSpPr>
         <p:sp>
@@ -11336,7 +11538,7 @@
           <p:spPr>
             <a:xfrm>
               <a:off x="0" y="0"/>
-              <a:ext cx="1363487" cy="408623"/>
+              <a:ext cx="1363489" cy="408624"/>
             </a:xfrm>
             <a:prstGeom prst="roundRect">
               <a:avLst>
@@ -11433,7 +11635,7 @@
         <p:spPr>
           <a:xfrm>
             <a:off x="2630364" y="3690161"/>
-            <a:ext cx="2509674" cy="304801"/>
+            <a:ext cx="2509675" cy="304801"/>
           </a:xfrm>
           <a:prstGeom prst="rect">
             <a:avLst/>
@@ -11490,9 +11692,9 @@
         <p:grpSpPr>
           <a:xfrm>
             <a:off x="1532964" y="4163590"/>
-            <a:ext cx="849670" cy="416183"/>
+            <a:ext cx="849672" cy="416183"/>
             <a:chOff x="0" y="0"/>
-            <a:chExt cx="849669" cy="416182"/>
+            <a:chExt cx="849671" cy="416182"/>
           </a:xfrm>
         </p:grpSpPr>
         <p:sp>
@@ -11504,7 +11706,7 @@
           <p:spPr>
             <a:xfrm>
               <a:off x="0" y="0"/>
-              <a:ext cx="849670" cy="408623"/>
+              <a:ext cx="849672" cy="408624"/>
             </a:xfrm>
             <a:prstGeom prst="roundRect">
               <a:avLst>
@@ -12178,7 +12380,7 @@
         <p:spPr>
           <a:xfrm>
             <a:off x="1044097" y="1064529"/>
-            <a:ext cx="2033508" cy="396237"/>
+            <a:ext cx="2033507" cy="396237"/>
           </a:xfrm>
           <a:prstGeom prst="rect">
             <a:avLst/>
@@ -12381,7 +12583,7 @@
         </p:nvSpPr>
         <p:spPr>
           <a:xfrm>
-            <a:off x="1044097" y="2624172"/>
+            <a:off x="1044097" y="2624171"/>
             <a:ext cx="1772649" cy="396237"/>
           </a:xfrm>
           <a:prstGeom prst="rect">
@@ -12432,7 +12634,7 @@
         </p:nvSpPr>
         <p:spPr>
           <a:xfrm>
-            <a:off x="1044095" y="3144048"/>
+            <a:off x="1044094" y="3144048"/>
             <a:ext cx="4432803" cy="396237"/>
           </a:xfrm>
           <a:prstGeom prst="rect">
@@ -12584,10 +12786,10 @@
         </p:nvGrpSpPr>
         <p:grpSpPr>
           <a:xfrm>
-            <a:off x="925723" y="1192807"/>
-            <a:ext cx="1901335" cy="408624"/>
-            <a:chOff x="0" y="0"/>
-            <a:chExt cx="1901333" cy="408622"/>
+            <a:off x="925721" y="1192806"/>
+            <a:ext cx="1901338" cy="408626"/>
+            <a:chOff x="-1" y="-1"/>
+            <a:chExt cx="1901337" cy="408625"/>
           </a:xfrm>
         </p:grpSpPr>
         <p:sp>
@@ -12598,8 +12800,8 @@
           </p:nvSpPr>
           <p:spPr>
             <a:xfrm>
-              <a:off x="-1" y="-1"/>
-              <a:ext cx="1901335" cy="408623"/>
+              <a:off x="-2" y="-2"/>
+              <a:ext cx="1901338" cy="408627"/>
             </a:xfrm>
             <a:prstGeom prst="roundRect">
               <a:avLst>
@@ -12644,7 +12846,7 @@
           <p:spPr>
             <a:xfrm>
               <a:off x="19946" y="19946"/>
-              <a:ext cx="1863732" cy="319069"/>
+              <a:ext cx="1863731" cy="319069"/>
             </a:xfrm>
             <a:prstGeom prst="rect">
               <a:avLst/>
@@ -12743,10 +12945,10 @@
         </p:nvGrpSpPr>
         <p:grpSpPr>
           <a:xfrm>
-            <a:off x="1689554" y="1725875"/>
-            <a:ext cx="1137504" cy="408623"/>
-            <a:chOff x="0" y="0"/>
-            <a:chExt cx="1137502" cy="408622"/>
+            <a:off x="1689554" y="1725874"/>
+            <a:ext cx="1137506" cy="408625"/>
+            <a:chOff x="0" y="-1"/>
+            <a:chExt cx="1137504" cy="408624"/>
           </a:xfrm>
         </p:grpSpPr>
         <p:sp>
@@ -12757,8 +12959,8 @@
           </p:nvSpPr>
           <p:spPr>
             <a:xfrm>
-              <a:off x="0" y="-1"/>
-              <a:ext cx="1137503" cy="408623"/>
+              <a:off x="0" y="-2"/>
+              <a:ext cx="1137506" cy="408626"/>
             </a:xfrm>
             <a:prstGeom prst="roundRect">
               <a:avLst>
@@ -12803,7 +13005,7 @@
           <p:spPr>
             <a:xfrm>
               <a:off x="19945" y="19946"/>
-              <a:ext cx="1109620" cy="319069"/>
+              <a:ext cx="1109619" cy="319069"/>
             </a:xfrm>
             <a:prstGeom prst="rect">
               <a:avLst/>
@@ -12854,8 +13056,8 @@
         </p:nvSpPr>
         <p:spPr>
           <a:xfrm>
-            <a:off x="3043632" y="1769895"/>
-            <a:ext cx="5473048" cy="279401"/>
+            <a:off x="3043631" y="1769895"/>
+            <a:ext cx="5473050" cy="279401"/>
           </a:xfrm>
           <a:prstGeom prst="rect">
             <a:avLst/>
@@ -12902,10 +13104,10 @@
         </p:nvGrpSpPr>
         <p:grpSpPr>
           <a:xfrm>
-            <a:off x="1559242" y="2246060"/>
-            <a:ext cx="1267816" cy="408623"/>
-            <a:chOff x="0" y="0"/>
-            <a:chExt cx="1267814" cy="408622"/>
+            <a:off x="1559242" y="2246058"/>
+            <a:ext cx="1267818" cy="408626"/>
+            <a:chOff x="0" y="-1"/>
+            <a:chExt cx="1267816" cy="408624"/>
           </a:xfrm>
         </p:grpSpPr>
         <p:sp>
@@ -12916,8 +13118,8 @@
           </p:nvSpPr>
           <p:spPr>
             <a:xfrm>
-              <a:off x="0" y="-1"/>
-              <a:ext cx="1267815" cy="408623"/>
+              <a:off x="0" y="-2"/>
+              <a:ext cx="1267818" cy="408626"/>
             </a:xfrm>
             <a:prstGeom prst="roundRect">
               <a:avLst>
@@ -13013,8 +13215,8 @@
         </p:nvSpPr>
         <p:spPr>
           <a:xfrm>
-            <a:off x="3043632" y="2302781"/>
-            <a:ext cx="6288504" cy="279401"/>
+            <a:off x="3043631" y="2302780"/>
+            <a:ext cx="6288506" cy="279401"/>
           </a:xfrm>
           <a:prstGeom prst="rect">
             <a:avLst/>
@@ -13080,10 +13282,10 @@
         </p:nvGrpSpPr>
         <p:grpSpPr>
           <a:xfrm>
-            <a:off x="796636" y="2766248"/>
-            <a:ext cx="2030421" cy="408624"/>
+            <a:off x="796636" y="2766247"/>
+            <a:ext cx="2030423" cy="408626"/>
             <a:chOff x="0" y="0"/>
-            <a:chExt cx="2030420" cy="408623"/>
+            <a:chExt cx="2030421" cy="408625"/>
           </a:xfrm>
         </p:grpSpPr>
         <p:sp>
@@ -13095,7 +13297,7 @@
           <p:spPr>
             <a:xfrm>
               <a:off x="0" y="-1"/>
-              <a:ext cx="2030421" cy="408625"/>
+              <a:ext cx="2030423" cy="408626"/>
             </a:xfrm>
             <a:prstGeom prst="roundRect">
               <a:avLst>
@@ -13246,10 +13448,10 @@
         </p:nvGrpSpPr>
         <p:grpSpPr>
           <a:xfrm>
-            <a:off x="1428929" y="3324535"/>
-            <a:ext cx="1398128" cy="408623"/>
-            <a:chOff x="0" y="0"/>
-            <a:chExt cx="1398126" cy="408622"/>
+            <a:off x="1428927" y="3324534"/>
+            <a:ext cx="1398132" cy="408625"/>
+            <a:chOff x="-1" y="-1"/>
+            <a:chExt cx="1398130" cy="408624"/>
           </a:xfrm>
         </p:grpSpPr>
         <p:sp>
@@ -13260,8 +13462,8 @@
           </p:nvSpPr>
           <p:spPr>
             <a:xfrm>
-              <a:off x="-1" y="-1"/>
-              <a:ext cx="1398128" cy="408623"/>
+              <a:off x="-2" y="-2"/>
+              <a:ext cx="1398132" cy="408626"/>
             </a:xfrm>
             <a:prstGeom prst="roundRect">
               <a:avLst>
@@ -13306,7 +13508,7 @@
           <p:spPr>
             <a:xfrm>
               <a:off x="19946" y="19946"/>
-              <a:ext cx="1360991" cy="319069"/>
+              <a:ext cx="1360990" cy="319069"/>
             </a:xfrm>
             <a:prstGeom prst="rect">
               <a:avLst/>
@@ -13357,8 +13559,8 @@
         </p:nvSpPr>
         <p:spPr>
           <a:xfrm>
-            <a:off x="3043632" y="3286005"/>
-            <a:ext cx="6262815" cy="520701"/>
+            <a:off x="3043632" y="3286004"/>
+            <a:ext cx="6262816" cy="520701"/>
           </a:xfrm>
           <a:prstGeom prst="rect">
             <a:avLst/>
@@ -13426,19 +13628,13 @@
                 <a:solidFill>
                   <a:srgbClr val="242415"/>
                 </a:solidFill>
-                <a:latin typeface="Open Sans"/>
-                <a:ea typeface="Open Sans"/>
-                <a:cs typeface="Open Sans"/>
-                <a:sym typeface="Open Sans"/>
-              </a:defRPr>
-            </a:pPr>
-            <a:r>
-              <a:rPr>
-                <a:latin typeface="Consolas"/>
-                <a:ea typeface="Consolas"/>
-                <a:cs typeface="Consolas"/>
-                <a:sym typeface="Consolas"/>
-              </a:rPr>
+                <a:latin typeface="Consolas"/>
+                <a:ea typeface="Consolas"/>
+                <a:cs typeface="Consolas"/>
+                <a:sym typeface="Consolas"/>
+              </a:defRPr>
+            </a:pPr>
+            <a:r>
               <a:t>indicar si son iguales o no.</a:t>
             </a:r>
           </a:p>
@@ -13452,10 +13648,10 @@
         </p:nvGrpSpPr>
         <p:grpSpPr>
           <a:xfrm>
-            <a:off x="1428929" y="3890371"/>
-            <a:ext cx="1398128" cy="408623"/>
-            <a:chOff x="0" y="0"/>
-            <a:chExt cx="1398126" cy="408622"/>
+            <a:off x="1428927" y="3890370"/>
+            <a:ext cx="1398132" cy="408625"/>
+            <a:chOff x="-1" y="-1"/>
+            <a:chExt cx="1398130" cy="408624"/>
           </a:xfrm>
         </p:grpSpPr>
         <p:sp>
@@ -13466,8 +13662,8 @@
           </p:nvSpPr>
           <p:spPr>
             <a:xfrm>
-              <a:off x="-1" y="-1"/>
-              <a:ext cx="1398128" cy="408623"/>
+              <a:off x="-2" y="-2"/>
+              <a:ext cx="1398132" cy="408626"/>
             </a:xfrm>
             <a:prstGeom prst="roundRect">
               <a:avLst>
@@ -13512,7 +13708,7 @@
           <p:spPr>
             <a:xfrm>
               <a:off x="19946" y="19946"/>
-              <a:ext cx="1360991" cy="319069"/>
+              <a:ext cx="1360990" cy="319069"/>
             </a:xfrm>
             <a:prstGeom prst="rect">
               <a:avLst/>
@@ -13563,8 +13759,8 @@
         </p:nvSpPr>
         <p:spPr>
           <a:xfrm>
-            <a:off x="3043632" y="3857691"/>
-            <a:ext cx="6262815" cy="520701"/>
+            <a:off x="3043632" y="3857690"/>
+            <a:ext cx="6262816" cy="520701"/>
           </a:xfrm>
           <a:prstGeom prst="rect">
             <a:avLst/>
@@ -13620,19 +13816,13 @@
                 <a:solidFill>
                   <a:srgbClr val="242415"/>
                 </a:solidFill>
-                <a:latin typeface="Open Sans"/>
-                <a:ea typeface="Open Sans"/>
-                <a:cs typeface="Open Sans"/>
-                <a:sym typeface="Open Sans"/>
-              </a:defRPr>
-            </a:pPr>
-            <a:r>
-              <a:rPr>
-                <a:latin typeface="Consolas"/>
-                <a:ea typeface="Consolas"/>
-                <a:cs typeface="Consolas"/>
-                <a:sym typeface="Consolas"/>
-              </a:rPr>
+                <a:latin typeface="Consolas"/>
+                <a:ea typeface="Consolas"/>
+                <a:cs typeface="Consolas"/>
+                <a:sym typeface="Consolas"/>
+              </a:defRPr>
+            </a:pPr>
+            <a:r>
               <a:t>a utilizar.</a:t>
             </a:r>
           </a:p>
@@ -13900,7 +14090,7 @@
         </p:nvSpPr>
         <p:spPr>
           <a:xfrm>
-            <a:off x="1044097" y="2624172"/>
+            <a:off x="1044097" y="2624171"/>
             <a:ext cx="1363669" cy="396237"/>
           </a:xfrm>
           <a:prstGeom prst="rect">
@@ -14054,7 +14244,7 @@
         <p:spPr>
           <a:xfrm>
             <a:off x="5154672" y="2084097"/>
-            <a:ext cx="2662756" cy="1077277"/>
+            <a:ext cx="2662757" cy="1077277"/>
           </a:xfrm>
           <a:prstGeom prst="roundRect">
             <a:avLst>
@@ -14097,7 +14287,7 @@
         <p:spPr>
           <a:xfrm>
             <a:off x="5243460" y="2107736"/>
-            <a:ext cx="2527106" cy="396237"/>
+            <a:ext cx="2527107" cy="396237"/>
           </a:xfrm>
           <a:prstGeom prst="rect">
             <a:avLst/>
@@ -14145,7 +14335,7 @@
         <p:spPr>
           <a:xfrm>
             <a:off x="5472391" y="2465266"/>
-            <a:ext cx="2252456" cy="585771"/>
+            <a:ext cx="2252457" cy="585769"/>
           </a:xfrm>
           <a:prstGeom prst="rect">
             <a:avLst/>
@@ -14250,14 +14440,14 @@
     </a:clrScheme>
     <a:fontScheme name="Office Theme">
       <a:majorFont>
+        <a:latin typeface="Calibri"/>
+        <a:ea typeface="Calibri"/>
+        <a:cs typeface="Calibri"/>
+      </a:majorFont>
+      <a:minorFont>
         <a:latin typeface="Helvetica"/>
         <a:ea typeface="Helvetica"/>
         <a:cs typeface="Helvetica"/>
-      </a:majorFont>
-      <a:minorFont>
-        <a:latin typeface="Calibri"/>
-        <a:ea typeface="Calibri"/>
-        <a:cs typeface="Calibri"/>
       </a:minorFont>
     </a:fontScheme>
     <a:fmtScheme name="Office Theme">
@@ -14438,9 +14628,9 @@
             </a:solidFill>
             <a:effectLst/>
             <a:uFillTx/>
-            <a:latin typeface="+mn-lt"/>
-            <a:ea typeface="+mn-ea"/>
-            <a:cs typeface="+mn-cs"/>
+            <a:latin typeface="+mj-lt"/>
+            <a:ea typeface="+mj-ea"/>
+            <a:cs typeface="+mj-cs"/>
             <a:sym typeface="Calibri"/>
           </a:defRPr>
         </a:defPPr>
@@ -15009,9 +15199,9 @@
             </a:solidFill>
             <a:effectLst/>
             <a:uFillTx/>
-            <a:latin typeface="+mn-lt"/>
-            <a:ea typeface="+mn-ea"/>
-            <a:cs typeface="+mn-cs"/>
+            <a:latin typeface="+mj-lt"/>
+            <a:ea typeface="+mj-ea"/>
+            <a:cs typeface="+mj-cs"/>
             <a:sym typeface="Calibri"/>
           </a:defRPr>
         </a:defPPr>
@@ -15304,14 +15494,14 @@
     </a:clrScheme>
     <a:fontScheme name="Office Theme">
       <a:majorFont>
+        <a:latin typeface="Calibri"/>
+        <a:ea typeface="Calibri"/>
+        <a:cs typeface="Calibri"/>
+      </a:majorFont>
+      <a:minorFont>
         <a:latin typeface="Helvetica"/>
         <a:ea typeface="Helvetica"/>
         <a:cs typeface="Helvetica"/>
-      </a:majorFont>
-      <a:minorFont>
-        <a:latin typeface="Calibri"/>
-        <a:ea typeface="Calibri"/>
-        <a:cs typeface="Calibri"/>
       </a:minorFont>
     </a:fontScheme>
     <a:fmtScheme name="Office Theme">
@@ -15492,9 +15682,9 @@
             </a:solidFill>
             <a:effectLst/>
             <a:uFillTx/>
-            <a:latin typeface="+mn-lt"/>
-            <a:ea typeface="+mn-ea"/>
-            <a:cs typeface="+mn-cs"/>
+            <a:latin typeface="+mj-lt"/>
+            <a:ea typeface="+mj-ea"/>
+            <a:cs typeface="+mj-cs"/>
             <a:sym typeface="Calibri"/>
           </a:defRPr>
         </a:defPPr>
@@ -16063,9 +16253,9 @@
             </a:solidFill>
             <a:effectLst/>
             <a:uFillTx/>
-            <a:latin typeface="+mn-lt"/>
-            <a:ea typeface="+mn-ea"/>
-            <a:cs typeface="+mn-cs"/>
+            <a:latin typeface="+mj-lt"/>
+            <a:ea typeface="+mj-ea"/>
+            <a:cs typeface="+mj-cs"/>
             <a:sym typeface="Calibri"/>
           </a:defRPr>
         </a:defPPr>

</xml_diff>